<commit_message>
add a course review
</commit_message>
<xml_diff>
--- a/course/compiler/LectureNotes/(Spring2018)Lecture4.pptx
+++ b/course/compiler/LectureNotes/(Spring2018)Lecture4.pptx
@@ -258,7 +258,7 @@
                 <a:ea typeface="微软雅黑" panose="020B0503020204020204" pitchFamily="34" charset="-122"/>
               </a:rPr>
               <a:pPr algn="r" rtl="0"/>
-              <a:t>2017/5/21</a:t>
+              <a:t>2018/6/7</a:t>
             </a:fld>
             <a:endParaRPr lang="zh-CN" altLang="en-US" dirty="0">
               <a:latin typeface="微软雅黑" panose="020B0503020204020204" pitchFamily="34" charset="-122"/>
@@ -445,7 +445,7 @@
             <a:fld id="{229B22C3-6CB1-491B-AD00-E0837F23A3F3}" type="datetime1">
               <a:rPr lang="zh-CN" altLang="en-US" smtClean="0"/>
               <a:pPr/>
-              <a:t>2017/5/21</a:t>
+              <a:t>2018/6/7</a:t>
             </a:fld>
             <a:endParaRPr lang="zh-CN" altLang="en-US" dirty="0"/>
           </a:p>
@@ -1041,7 +1041,7 @@
             <a:fld id="{A7392AAC-879E-4B39-8824-AF6B730A809E}" type="datetime1">
               <a:rPr lang="zh-CN" altLang="en-US" smtClean="0"/>
               <a:pPr/>
-              <a:t>2017/5/21</a:t>
+              <a:t>2018/6/7</a:t>
             </a:fld>
             <a:endParaRPr lang="zh-CN" altLang="en-US" dirty="0"/>
           </a:p>
@@ -1382,7 +1382,7 @@
             <a:fld id="{7118C275-B304-48F5-8C4F-015CBCF4E7C1}" type="datetime1">
               <a:rPr lang="zh-CN" altLang="en-US" smtClean="0"/>
               <a:pPr/>
-              <a:t>2017/5/21</a:t>
+              <a:t>2018/6/7</a:t>
             </a:fld>
             <a:r>
               <a:rPr lang="zh-CN" altLang="en-US" dirty="0"/>
@@ -1588,7 +1588,7 @@
             <a:fld id="{98791AA9-DDCB-4BA8-AD1D-963A3AA00622}" type="datetime1">
               <a:rPr lang="zh-CN" altLang="en-US" smtClean="0"/>
               <a:pPr/>
-              <a:t>2017/5/21</a:t>
+              <a:t>2018/6/7</a:t>
             </a:fld>
             <a:endParaRPr lang="zh-CN" altLang="en-US" dirty="0"/>
           </a:p>
@@ -1792,7 +1792,7 @@
             <a:fld id="{9170426F-E661-472B-BE42-25E072CD46D9}" type="datetime1">
               <a:rPr lang="zh-CN" altLang="en-US" smtClean="0"/>
               <a:pPr/>
-              <a:t>2017/5/21</a:t>
+              <a:t>2018/6/7</a:t>
             </a:fld>
             <a:endParaRPr lang="zh-CN" altLang="en-US" dirty="0"/>
           </a:p>
@@ -2114,7 +2114,7 @@
             <a:fld id="{9BA78444-6099-4C0A-A3A9-C6F3C5D7F289}" type="datetime1">
               <a:rPr lang="zh-CN" altLang="en-US" smtClean="0"/>
               <a:pPr/>
-              <a:t>2017/5/21</a:t>
+              <a:t>2018/6/7</a:t>
             </a:fld>
             <a:endParaRPr lang="zh-CN" altLang="en-US" dirty="0"/>
           </a:p>
@@ -3226,7 +3226,7 @@
             <a:fld id="{AF5F6A19-70BF-4380-9A40-68C9536408C6}" type="datetime1">
               <a:rPr lang="zh-CN" altLang="en-US" smtClean="0"/>
               <a:pPr/>
-              <a:t>2017/5/21</a:t>
+              <a:t>2018/6/7</a:t>
             </a:fld>
             <a:endParaRPr lang="zh-CN" altLang="en-US" dirty="0"/>
           </a:p>
@@ -3625,7 +3625,7 @@
             <a:fld id="{6017EB90-196C-4C15-BD31-13E0E0436C73}" type="datetime1">
               <a:rPr lang="zh-CN" altLang="en-US" smtClean="0"/>
               <a:pPr/>
-              <a:t>2017/5/21</a:t>
+              <a:t>2018/6/7</a:t>
             </a:fld>
             <a:r>
               <a:rPr lang="zh-CN" altLang="en-US" dirty="0"/>
@@ -4107,7 +4107,7 @@
             <a:fld id="{C2EC0F41-B48F-4298-A7F6-618EB9D22195}" type="datetime1">
               <a:rPr lang="zh-CN" altLang="en-US" smtClean="0"/>
               <a:pPr/>
-              <a:t>2017/5/21</a:t>
+              <a:t>2018/6/7</a:t>
             </a:fld>
             <a:endParaRPr lang="zh-CN" altLang="en-US" dirty="0"/>
           </a:p>
@@ -4258,7 +4258,7 @@
             <a:fld id="{7DB2D836-56E8-4B15-857C-14B1A5B3B67B}" type="datetime1">
               <a:rPr lang="zh-CN" altLang="en-US" smtClean="0"/>
               <a:pPr/>
-              <a:t>2017/5/21</a:t>
+              <a:t>2018/6/7</a:t>
             </a:fld>
             <a:endParaRPr lang="zh-CN" altLang="en-US" dirty="0"/>
           </a:p>
@@ -4376,7 +4376,7 @@
             <a:fld id="{038D929F-7D8C-4CC3-8AC7-BB9B8FE2DEBF}" type="datetime1">
               <a:rPr lang="zh-CN" altLang="en-US" smtClean="0"/>
               <a:pPr/>
-              <a:t>2017/5/21</a:t>
+              <a:t>2018/6/7</a:t>
             </a:fld>
             <a:endParaRPr lang="zh-CN" altLang="en-US" dirty="0"/>
           </a:p>
@@ -4679,7 +4679,7 @@
             <a:fld id="{F7892ACC-8BC8-4C9E-9D2B-0669DA5038B6}" type="datetime1">
               <a:rPr lang="zh-CN" altLang="en-US" smtClean="0"/>
               <a:pPr/>
-              <a:t>2017/5/21</a:t>
+              <a:t>2018/6/7</a:t>
             </a:fld>
             <a:endParaRPr lang="zh-CN" altLang="en-US" dirty="0"/>
           </a:p>
@@ -4945,7 +4945,7 @@
             <a:fld id="{660B6A15-7713-4A08-BBFD-F297CCC2B976}" type="datetime1">
               <a:rPr lang="zh-CN" altLang="en-US" smtClean="0"/>
               <a:pPr/>
-              <a:t>2017/5/21</a:t>
+              <a:t>2018/6/7</a:t>
             </a:fld>
             <a:r>
               <a:rPr lang="zh-CN" altLang="en-US" dirty="0"/>
@@ -5775,7 +5775,7 @@
           <a:graphicData uri="http://schemas.openxmlformats.org/presentationml/2006/ole">
             <mc:AlternateContent xmlns:mc="http://schemas.openxmlformats.org/markup-compatibility/2006">
               <mc:Choice xmlns:v="urn:schemas-microsoft-com:vml" Requires="v">
-                <p:oleObj spid="_x0000_s11649" name="Equation" r:id="rId3" imgW="533160" imgH="634680" progId="Equation.DSMT4">
+                <p:oleObj spid="_x0000_s11657" name="Equation" r:id="rId3" imgW="533160" imgH="634680" progId="Equation.DSMT4">
                   <p:embed/>
                 </p:oleObj>
               </mc:Choice>
@@ -5872,7 +5872,7 @@
           <a:graphicData uri="http://schemas.openxmlformats.org/presentationml/2006/ole">
             <mc:AlternateContent xmlns:mc="http://schemas.openxmlformats.org/markup-compatibility/2006">
               <mc:Choice xmlns:v="urn:schemas-microsoft-com:vml" Requires="v">
-                <p:oleObj spid="_x0000_s11650" name="Equation" r:id="rId5" imgW="660240" imgH="482400" progId="Equation.DSMT4">
+                <p:oleObj spid="_x0000_s11658" name="Equation" r:id="rId5" imgW="660240" imgH="482400" progId="Equation.DSMT4">
                   <p:embed/>
                 </p:oleObj>
               </mc:Choice>
@@ -5929,7 +5929,7 @@
           <a:graphicData uri="http://schemas.openxmlformats.org/presentationml/2006/ole">
             <mc:AlternateContent xmlns:mc="http://schemas.openxmlformats.org/markup-compatibility/2006">
               <mc:Choice xmlns:v="urn:schemas-microsoft-com:vml" Requires="v">
-                <p:oleObj spid="_x0000_s11651" name="Equation" r:id="rId7" imgW="1549080" imgH="482400" progId="Equation.DSMT4">
+                <p:oleObj spid="_x0000_s11659" name="Equation" r:id="rId7" imgW="1549080" imgH="482400" progId="Equation.DSMT4">
                   <p:embed/>
                 </p:oleObj>
               </mc:Choice>
@@ -6026,7 +6026,7 @@
           <a:graphicData uri="http://schemas.openxmlformats.org/presentationml/2006/ole">
             <mc:AlternateContent xmlns:mc="http://schemas.openxmlformats.org/markup-compatibility/2006">
               <mc:Choice xmlns:v="urn:schemas-microsoft-com:vml" Requires="v">
-                <p:oleObj spid="_x0000_s11652" name="Equation" r:id="rId9" imgW="2819160" imgH="812520" progId="Equation.DSMT4">
+                <p:oleObj spid="_x0000_s11660" name="Equation" r:id="rId9" imgW="2819160" imgH="812520" progId="Equation.DSMT4">
                   <p:embed/>
                 </p:oleObj>
               </mc:Choice>
@@ -6325,7 +6325,7 @@
           <a:graphicData uri="http://schemas.openxmlformats.org/presentationml/2006/ole">
             <mc:AlternateContent xmlns:mc="http://schemas.openxmlformats.org/markup-compatibility/2006">
               <mc:Choice xmlns:v="urn:schemas-microsoft-com:vml" Requires="v">
-                <p:oleObj spid="_x0000_s13070" name="Equation" r:id="rId3" imgW="469800" imgH="164880" progId="Equation.DSMT4">
+                <p:oleObj spid="_x0000_s13088" name="Equation" r:id="rId3" imgW="469800" imgH="164880" progId="Equation.DSMT4">
                   <p:embed/>
                 </p:oleObj>
               </mc:Choice>
@@ -6465,7 +6465,7 @@
           <a:graphicData uri="http://schemas.openxmlformats.org/presentationml/2006/ole">
             <mc:AlternateContent xmlns:mc="http://schemas.openxmlformats.org/markup-compatibility/2006">
               <mc:Choice xmlns:v="urn:schemas-microsoft-com:vml" Requires="v">
-                <p:oleObj spid="_x0000_s13071" name="Equation" r:id="rId6" imgW="558720" imgH="152280" progId="Equation.DSMT4">
+                <p:oleObj spid="_x0000_s13089" name="Equation" r:id="rId6" imgW="558720" imgH="152280" progId="Equation.DSMT4">
                   <p:embed/>
                 </p:oleObj>
               </mc:Choice>
@@ -6522,7 +6522,7 @@
           <a:graphicData uri="http://schemas.openxmlformats.org/presentationml/2006/ole">
             <mc:AlternateContent xmlns:mc="http://schemas.openxmlformats.org/markup-compatibility/2006">
               <mc:Choice xmlns:v="urn:schemas-microsoft-com:vml" Requires="v">
-                <p:oleObj spid="_x0000_s13072" name="Equation" r:id="rId8" imgW="419040" imgH="139680" progId="Equation.DSMT4">
+                <p:oleObj spid="_x0000_s13090" name="Equation" r:id="rId8" imgW="419040" imgH="139680" progId="Equation.DSMT4">
                   <p:embed/>
                 </p:oleObj>
               </mc:Choice>
@@ -6579,7 +6579,7 @@
           <a:graphicData uri="http://schemas.openxmlformats.org/presentationml/2006/ole">
             <mc:AlternateContent xmlns:mc="http://schemas.openxmlformats.org/markup-compatibility/2006">
               <mc:Choice xmlns:v="urn:schemas-microsoft-com:vml" Requires="v">
-                <p:oleObj spid="_x0000_s13073" name="Equation" r:id="rId10" imgW="596880" imgH="330120" progId="Equation.DSMT4">
+                <p:oleObj spid="_x0000_s13091" name="Equation" r:id="rId10" imgW="596880" imgH="330120" progId="Equation.DSMT4">
                   <p:embed/>
                 </p:oleObj>
               </mc:Choice>
@@ -6676,7 +6676,7 @@
           <a:graphicData uri="http://schemas.openxmlformats.org/presentationml/2006/ole">
             <mc:AlternateContent xmlns:mc="http://schemas.openxmlformats.org/markup-compatibility/2006">
               <mc:Choice xmlns:v="urn:schemas-microsoft-com:vml" Requires="v">
-                <p:oleObj spid="_x0000_s13074" name="Equation" r:id="rId12" imgW="1625400" imgH="177480" progId="Equation.DSMT4">
+                <p:oleObj spid="_x0000_s13092" name="Equation" r:id="rId12" imgW="1625400" imgH="177480" progId="Equation.DSMT4">
                   <p:embed/>
                 </p:oleObj>
               </mc:Choice>
@@ -6733,7 +6733,7 @@
           <a:graphicData uri="http://schemas.openxmlformats.org/presentationml/2006/ole">
             <mc:AlternateContent xmlns:mc="http://schemas.openxmlformats.org/markup-compatibility/2006">
               <mc:Choice xmlns:v="urn:schemas-microsoft-com:vml" Requires="v">
-                <p:oleObj spid="_x0000_s13075" name="Equation" r:id="rId14" imgW="1307880" imgH="342720" progId="Equation.DSMT4">
+                <p:oleObj spid="_x0000_s13093" name="Equation" r:id="rId14" imgW="1307880" imgH="342720" progId="Equation.DSMT4">
                   <p:embed/>
                 </p:oleObj>
               </mc:Choice>
@@ -6830,7 +6830,7 @@
           <a:graphicData uri="http://schemas.openxmlformats.org/presentationml/2006/ole">
             <mc:AlternateContent xmlns:mc="http://schemas.openxmlformats.org/markup-compatibility/2006">
               <mc:Choice xmlns:v="urn:schemas-microsoft-com:vml" Requires="v">
-                <p:oleObj spid="_x0000_s13076" name="Equation" r:id="rId16" imgW="533160" imgH="634680" progId="Equation.DSMT4">
+                <p:oleObj spid="_x0000_s13094" name="Equation" r:id="rId16" imgW="533160" imgH="634680" progId="Equation.DSMT4">
                   <p:embed/>
                 </p:oleObj>
               </mc:Choice>
@@ -6927,7 +6927,7 @@
           <a:graphicData uri="http://schemas.openxmlformats.org/presentationml/2006/ole">
             <mc:AlternateContent xmlns:mc="http://schemas.openxmlformats.org/markup-compatibility/2006">
               <mc:Choice xmlns:v="urn:schemas-microsoft-com:vml" Requires="v">
-                <p:oleObj spid="_x0000_s13077" name="Equation" r:id="rId18" imgW="660240" imgH="482400" progId="Equation.DSMT4">
+                <p:oleObj spid="_x0000_s13095" name="Equation" r:id="rId18" imgW="660240" imgH="482400" progId="Equation.DSMT4">
                   <p:embed/>
                 </p:oleObj>
               </mc:Choice>
@@ -7024,7 +7024,7 @@
           <a:graphicData uri="http://schemas.openxmlformats.org/presentationml/2006/ole">
             <mc:AlternateContent xmlns:mc="http://schemas.openxmlformats.org/markup-compatibility/2006">
               <mc:Choice xmlns:v="urn:schemas-microsoft-com:vml" Requires="v">
-                <p:oleObj spid="_x0000_s13078" name="Equation" r:id="rId20" imgW="647640" imgH="812520" progId="Equation.DSMT4">
+                <p:oleObj spid="_x0000_s13096" name="Equation" r:id="rId20" imgW="647640" imgH="812520" progId="Equation.DSMT4">
                   <p:embed/>
                 </p:oleObj>
               </mc:Choice>
@@ -7307,7 +7307,7 @@
           <a:graphicData uri="http://schemas.openxmlformats.org/presentationml/2006/ole">
             <mc:AlternateContent xmlns:mc="http://schemas.openxmlformats.org/markup-compatibility/2006">
               <mc:Choice xmlns:v="urn:schemas-microsoft-com:vml" Requires="v">
-                <p:oleObj spid="_x0000_s13662" name="Equation" r:id="rId3" imgW="596880" imgH="330120" progId="Equation.DSMT4">
+                <p:oleObj spid="_x0000_s13670" name="Equation" r:id="rId3" imgW="596880" imgH="330120" progId="Equation.DSMT4">
                   <p:embed/>
                 </p:oleObj>
               </mc:Choice>
@@ -7364,7 +7364,7 @@
           <a:graphicData uri="http://schemas.openxmlformats.org/presentationml/2006/ole">
             <mc:AlternateContent xmlns:mc="http://schemas.openxmlformats.org/markup-compatibility/2006">
               <mc:Choice xmlns:v="urn:schemas-microsoft-com:vml" Requires="v">
-                <p:oleObj spid="_x0000_s13663" name="Equation" r:id="rId5" imgW="723600" imgH="139680" progId="Equation.DSMT4">
+                <p:oleObj spid="_x0000_s13671" name="Equation" r:id="rId5" imgW="723600" imgH="139680" progId="Equation.DSMT4">
                   <p:embed/>
                 </p:oleObj>
               </mc:Choice>
@@ -7421,7 +7421,7 @@
           <a:graphicData uri="http://schemas.openxmlformats.org/presentationml/2006/ole">
             <mc:AlternateContent xmlns:mc="http://schemas.openxmlformats.org/markup-compatibility/2006">
               <mc:Choice xmlns:v="urn:schemas-microsoft-com:vml" Requires="v">
-                <p:oleObj spid="_x0000_s13664" name="Equation" r:id="rId7" imgW="406080" imgH="164880" progId="Equation.DSMT4">
+                <p:oleObj spid="_x0000_s13672" name="Equation" r:id="rId7" imgW="406080" imgH="164880" progId="Equation.DSMT4">
                   <p:embed/>
                 </p:oleObj>
               </mc:Choice>
@@ -7478,7 +7478,7 @@
           <a:graphicData uri="http://schemas.openxmlformats.org/presentationml/2006/ole">
             <mc:AlternateContent xmlns:mc="http://schemas.openxmlformats.org/markup-compatibility/2006">
               <mc:Choice xmlns:v="urn:schemas-microsoft-com:vml" Requires="v">
-                <p:oleObj spid="_x0000_s13665" name="Equation" r:id="rId9" imgW="685800" imgH="152280" progId="Equation.DSMT4">
+                <p:oleObj spid="_x0000_s13673" name="Equation" r:id="rId9" imgW="685800" imgH="152280" progId="Equation.DSMT4">
                   <p:embed/>
                 </p:oleObj>
               </mc:Choice>
@@ -7694,7 +7694,7 @@
           <a:graphicData uri="http://schemas.openxmlformats.org/presentationml/2006/ole">
             <mc:AlternateContent xmlns:mc="http://schemas.openxmlformats.org/markup-compatibility/2006">
               <mc:Choice xmlns:v="urn:schemas-microsoft-com:vml" Requires="v">
-                <p:oleObj spid="_x0000_s14763" name="Equation" r:id="rId3" imgW="1549080" imgH="330120" progId="Equation.DSMT4">
+                <p:oleObj spid="_x0000_s14773" name="Equation" r:id="rId3" imgW="1549080" imgH="330120" progId="Equation.DSMT4">
                   <p:embed/>
                 </p:oleObj>
               </mc:Choice>
@@ -7751,7 +7751,7 @@
           <a:graphicData uri="http://schemas.openxmlformats.org/presentationml/2006/ole">
             <mc:AlternateContent xmlns:mc="http://schemas.openxmlformats.org/markup-compatibility/2006">
               <mc:Choice xmlns:v="urn:schemas-microsoft-com:vml" Requires="v">
-                <p:oleObj spid="_x0000_s14764" name="Equation" r:id="rId5" imgW="622080" imgH="177480" progId="Equation.DSMT4">
+                <p:oleObj spid="_x0000_s14774" name="Equation" r:id="rId5" imgW="622080" imgH="177480" progId="Equation.DSMT4">
                   <p:embed/>
                 </p:oleObj>
               </mc:Choice>
@@ -7848,7 +7848,7 @@
           <a:graphicData uri="http://schemas.openxmlformats.org/presentationml/2006/ole">
             <mc:AlternateContent xmlns:mc="http://schemas.openxmlformats.org/markup-compatibility/2006">
               <mc:Choice xmlns:v="urn:schemas-microsoft-com:vml" Requires="v">
-                <p:oleObj spid="_x0000_s14765" name="Equation" r:id="rId7" imgW="571320" imgH="330120" progId="Equation.DSMT4">
+                <p:oleObj spid="_x0000_s14775" name="Equation" r:id="rId7" imgW="571320" imgH="330120" progId="Equation.DSMT4">
                   <p:embed/>
                 </p:oleObj>
               </mc:Choice>
@@ -7905,7 +7905,7 @@
           <a:graphicData uri="http://schemas.openxmlformats.org/presentationml/2006/ole">
             <mc:AlternateContent xmlns:mc="http://schemas.openxmlformats.org/markup-compatibility/2006">
               <mc:Choice xmlns:v="urn:schemas-microsoft-com:vml" Requires="v">
-                <p:oleObj spid="_x0000_s14766" name="Equation" r:id="rId9" imgW="1143000" imgH="177480" progId="Equation.DSMT4">
+                <p:oleObj spid="_x0000_s14776" name="Equation" r:id="rId9" imgW="1143000" imgH="177480" progId="Equation.DSMT4">
                   <p:embed/>
                 </p:oleObj>
               </mc:Choice>
@@ -8002,7 +8002,7 @@
           <a:graphicData uri="http://schemas.openxmlformats.org/presentationml/2006/ole">
             <mc:AlternateContent xmlns:mc="http://schemas.openxmlformats.org/markup-compatibility/2006">
               <mc:Choice xmlns:v="urn:schemas-microsoft-com:vml" Requires="v">
-                <p:oleObj spid="_x0000_s14767" name="Equation" r:id="rId11" imgW="825480" imgH="330120" progId="Equation.DSMT4">
+                <p:oleObj spid="_x0000_s14777" name="Equation" r:id="rId11" imgW="825480" imgH="330120" progId="Equation.DSMT4">
                   <p:embed/>
                 </p:oleObj>
               </mc:Choice>
@@ -8321,7 +8321,7 @@
           <a:graphicData uri="http://schemas.openxmlformats.org/presentationml/2006/ole">
             <mc:AlternateContent xmlns:mc="http://schemas.openxmlformats.org/markup-compatibility/2006">
               <mc:Choice xmlns:v="urn:schemas-microsoft-com:vml" Requires="v">
-                <p:oleObj spid="_x0000_s15441" name="Equation" r:id="rId3" imgW="647640" imgH="812520" progId="Equation.DSMT4">
+                <p:oleObj spid="_x0000_s15443" name="Equation" r:id="rId3" imgW="647640" imgH="812520" progId="Equation.DSMT4">
                   <p:embed/>
                 </p:oleObj>
               </mc:Choice>
@@ -8532,7 +8532,7 @@
           <a:graphicData uri="http://schemas.openxmlformats.org/presentationml/2006/ole">
             <mc:AlternateContent xmlns:mc="http://schemas.openxmlformats.org/markup-compatibility/2006">
               <mc:Choice xmlns:v="urn:schemas-microsoft-com:vml" Requires="v">
-                <p:oleObj spid="_x0000_s16462" name="Equation" r:id="rId3" imgW="647640" imgH="812520" progId="Equation.DSMT4">
+                <p:oleObj spid="_x0000_s16464" name="Equation" r:id="rId3" imgW="647640" imgH="812520" progId="Equation.DSMT4">
                   <p:embed/>
                 </p:oleObj>
               </mc:Choice>
@@ -9124,25 +9124,25 @@
           <p:nvPr>
             <p:extLst>
               <p:ext uri="{D42A27DB-BD31-4B8C-83A1-F6EECF244321}">
-                <p14:modId xmlns:p14="http://schemas.microsoft.com/office/powerpoint/2010/main" val="1089899602"/>
+                <p14:modId xmlns:p14="http://schemas.microsoft.com/office/powerpoint/2010/main" val="147717967"/>
               </p:ext>
             </p:extLst>
           </p:nvPr>
         </p:nvGraphicFramePr>
         <p:xfrm>
-          <a:off x="1938563" y="1600200"/>
-          <a:ext cx="1770486" cy="359229"/>
+          <a:off x="1963738" y="1600200"/>
+          <a:ext cx="1717675" cy="358775"/>
         </p:xfrm>
         <a:graphic>
           <a:graphicData uri="http://schemas.openxmlformats.org/presentationml/2006/ole">
             <mc:AlternateContent xmlns:mc="http://schemas.openxmlformats.org/markup-compatibility/2006">
               <mc:Choice xmlns:v="urn:schemas-microsoft-com:vml" Requires="v">
-                <p:oleObj spid="_x0000_s17819" name="Equation" r:id="rId3" imgW="876240" imgH="177480" progId="Equation.DSMT4">
+                <p:oleObj spid="_x0000_s17831" name="Equation" r:id="rId3" imgW="850680" imgH="177480" progId="Equation.DSMT4">
                   <p:embed/>
                 </p:oleObj>
               </mc:Choice>
               <mc:Fallback>
-                <p:oleObj name="Equation" r:id="rId3" imgW="876240" imgH="177480" progId="Equation.DSMT4">
+                <p:oleObj name="Equation" r:id="rId3" imgW="850680" imgH="177480" progId="Equation.DSMT4">
                   <p:embed/>
                   <p:pic>
                     <p:nvPicPr>
@@ -9158,8 +9158,8 @@
                     </p:blipFill>
                     <p:spPr>
                       <a:xfrm>
-                        <a:off x="1938563" y="1600200"/>
-                        <a:ext cx="1770486" cy="359229"/>
+                        <a:off x="1963738" y="1600200"/>
+                        <a:ext cx="1717675" cy="358775"/>
                       </a:xfrm>
                       <a:prstGeom prst="rect">
                         <a:avLst/>
@@ -9194,7 +9194,7 @@
           <a:graphicData uri="http://schemas.openxmlformats.org/presentationml/2006/ole">
             <mc:AlternateContent xmlns:mc="http://schemas.openxmlformats.org/markup-compatibility/2006">
               <mc:Choice xmlns:v="urn:schemas-microsoft-com:vml" Requires="v">
-                <p:oleObj spid="_x0000_s17820" name="Equation" r:id="rId5" imgW="571320" imgH="177480" progId="Equation.DSMT4">
+                <p:oleObj spid="_x0000_s17832" name="Equation" r:id="rId5" imgW="571320" imgH="177480" progId="Equation.DSMT4">
                   <p:embed/>
                 </p:oleObj>
               </mc:Choice>
@@ -9251,7 +9251,7 @@
           <a:graphicData uri="http://schemas.openxmlformats.org/presentationml/2006/ole">
             <mc:AlternateContent xmlns:mc="http://schemas.openxmlformats.org/markup-compatibility/2006">
               <mc:Choice xmlns:v="urn:schemas-microsoft-com:vml" Requires="v">
-                <p:oleObj spid="_x0000_s17821" name="Equation" r:id="rId7" imgW="1434960" imgH="190440" progId="Equation.DSMT4">
+                <p:oleObj spid="_x0000_s17833" name="Equation" r:id="rId7" imgW="1434960" imgH="190440" progId="Equation.DSMT4">
                   <p:embed/>
                 </p:oleObj>
               </mc:Choice>
@@ -9308,7 +9308,7 @@
           <a:graphicData uri="http://schemas.openxmlformats.org/presentationml/2006/ole">
             <mc:AlternateContent xmlns:mc="http://schemas.openxmlformats.org/markup-compatibility/2006">
               <mc:Choice xmlns:v="urn:schemas-microsoft-com:vml" Requires="v">
-                <p:oleObj spid="_x0000_s17822" name="Equation" r:id="rId9" imgW="355320" imgH="164880" progId="Equation.DSMT4">
+                <p:oleObj spid="_x0000_s17834" name="Equation" r:id="rId9" imgW="355320" imgH="164880" progId="Equation.DSMT4">
                   <p:embed/>
                 </p:oleObj>
               </mc:Choice>
@@ -9365,7 +9365,7 @@
           <a:graphicData uri="http://schemas.openxmlformats.org/presentationml/2006/ole">
             <mc:AlternateContent xmlns:mc="http://schemas.openxmlformats.org/markup-compatibility/2006">
               <mc:Choice xmlns:v="urn:schemas-microsoft-com:vml" Requires="v">
-                <p:oleObj spid="_x0000_s17823" name="Equation" r:id="rId11" imgW="634680" imgH="152280" progId="Equation.DSMT4">
+                <p:oleObj spid="_x0000_s17835" name="Equation" r:id="rId11" imgW="634680" imgH="152280" progId="Equation.DSMT4">
                   <p:embed/>
                 </p:oleObj>
               </mc:Choice>
@@ -9422,7 +9422,7 @@
           <a:graphicData uri="http://schemas.openxmlformats.org/presentationml/2006/ole">
             <mc:AlternateContent xmlns:mc="http://schemas.openxmlformats.org/markup-compatibility/2006">
               <mc:Choice xmlns:v="urn:schemas-microsoft-com:vml" Requires="v">
-                <p:oleObj spid="_x0000_s17824" name="Equation" r:id="rId13" imgW="101520" imgH="114120" progId="Equation.DSMT4">
+                <p:oleObj spid="_x0000_s17836" name="Equation" r:id="rId13" imgW="101520" imgH="114120" progId="Equation.DSMT4">
                   <p:embed/>
                 </p:oleObj>
               </mc:Choice>
@@ -9794,7 +9794,7 @@
           <a:graphicData uri="http://schemas.openxmlformats.org/presentationml/2006/ole">
             <mc:AlternateContent xmlns:mc="http://schemas.openxmlformats.org/markup-compatibility/2006">
               <mc:Choice xmlns:v="urn:schemas-microsoft-com:vml" Requires="v">
-                <p:oleObj spid="_x0000_s18668" name="Equation" r:id="rId3" imgW="1879560" imgH="190440" progId="Equation.DSMT4">
+                <p:oleObj spid="_x0000_s18676" name="Equation" r:id="rId3" imgW="1879560" imgH="190440" progId="Equation.DSMT4">
                   <p:embed/>
                 </p:oleObj>
               </mc:Choice>
@@ -9851,7 +9851,7 @@
           <a:graphicData uri="http://schemas.openxmlformats.org/presentationml/2006/ole">
             <mc:AlternateContent xmlns:mc="http://schemas.openxmlformats.org/markup-compatibility/2006">
               <mc:Choice xmlns:v="urn:schemas-microsoft-com:vml" Requires="v">
-                <p:oleObj spid="_x0000_s18669" name="Equation" r:id="rId5" imgW="482400" imgH="164880" progId="Equation.DSMT4">
+                <p:oleObj spid="_x0000_s18677" name="Equation" r:id="rId5" imgW="482400" imgH="164880" progId="Equation.DSMT4">
                   <p:embed/>
                 </p:oleObj>
               </mc:Choice>
@@ -9908,7 +9908,7 @@
           <a:graphicData uri="http://schemas.openxmlformats.org/presentationml/2006/ole">
             <mc:AlternateContent xmlns:mc="http://schemas.openxmlformats.org/markup-compatibility/2006">
               <mc:Choice xmlns:v="urn:schemas-microsoft-com:vml" Requires="v">
-                <p:oleObj spid="_x0000_s18670" name="Equation" r:id="rId7" imgW="812520" imgH="164880" progId="Equation.DSMT4">
+                <p:oleObj spid="_x0000_s18678" name="Equation" r:id="rId7" imgW="812520" imgH="164880" progId="Equation.DSMT4">
                   <p:embed/>
                 </p:oleObj>
               </mc:Choice>
@@ -9965,7 +9965,7 @@
           <a:graphicData uri="http://schemas.openxmlformats.org/presentationml/2006/ole">
             <mc:AlternateContent xmlns:mc="http://schemas.openxmlformats.org/markup-compatibility/2006">
               <mc:Choice xmlns:v="urn:schemas-microsoft-com:vml" Requires="v">
-                <p:oleObj spid="_x0000_s18671" name="Equation" r:id="rId9" imgW="101520" imgH="152280" progId="Equation.DSMT4">
+                <p:oleObj spid="_x0000_s18679" name="Equation" r:id="rId9" imgW="101520" imgH="152280" progId="Equation.DSMT4">
                   <p:embed/>
                 </p:oleObj>
               </mc:Choice>
@@ -10200,25 +10200,25 @@
           <p:nvPr>
             <p:extLst>
               <p:ext uri="{D42A27DB-BD31-4B8C-83A1-F6EECF244321}">
-                <p14:modId xmlns:p14="http://schemas.microsoft.com/office/powerpoint/2010/main" val="1265377463"/>
+                <p14:modId xmlns:p14="http://schemas.microsoft.com/office/powerpoint/2010/main" val="2899332409"/>
               </p:ext>
             </p:extLst>
           </p:nvPr>
         </p:nvGraphicFramePr>
         <p:xfrm>
-          <a:off x="2776764" y="2667680"/>
-          <a:ext cx="1817007" cy="368668"/>
+          <a:off x="2801938" y="2667000"/>
+          <a:ext cx="1765300" cy="369888"/>
         </p:xfrm>
         <a:graphic>
           <a:graphicData uri="http://schemas.openxmlformats.org/presentationml/2006/ole">
             <mc:AlternateContent xmlns:mc="http://schemas.openxmlformats.org/markup-compatibility/2006">
               <mc:Choice xmlns:v="urn:schemas-microsoft-com:vml" Requires="v">
-                <p:oleObj spid="_x0000_s19670" name="Equation" r:id="rId3" imgW="876240" imgH="177480" progId="Equation.DSMT4">
+                <p:oleObj spid="_x0000_s19678" name="Equation" r:id="rId3" imgW="850680" imgH="177480" progId="Equation.DSMT4">
                   <p:embed/>
                 </p:oleObj>
               </mc:Choice>
               <mc:Fallback>
-                <p:oleObj name="Equation" r:id="rId3" imgW="876240" imgH="177480" progId="Equation.DSMT4">
+                <p:oleObj name="Equation" r:id="rId3" imgW="850680" imgH="177480" progId="Equation.DSMT4">
                   <p:embed/>
                   <p:pic>
                     <p:nvPicPr>
@@ -10234,8 +10234,8 @@
                     </p:blipFill>
                     <p:spPr>
                       <a:xfrm>
-                        <a:off x="2776764" y="2667680"/>
-                        <a:ext cx="1817007" cy="368668"/>
+                        <a:off x="2801938" y="2667000"/>
+                        <a:ext cx="1765300" cy="369888"/>
                       </a:xfrm>
                       <a:prstGeom prst="rect">
                         <a:avLst/>
@@ -10270,7 +10270,7 @@
           <a:graphicData uri="http://schemas.openxmlformats.org/presentationml/2006/ole">
             <mc:AlternateContent xmlns:mc="http://schemas.openxmlformats.org/markup-compatibility/2006">
               <mc:Choice xmlns:v="urn:schemas-microsoft-com:vml" Requires="v">
-                <p:oleObj spid="_x0000_s19671" name="Equation" r:id="rId5" imgW="1688760" imgH="190440" progId="Equation.DSMT4">
+                <p:oleObj spid="_x0000_s19679" name="Equation" r:id="rId5" imgW="1688760" imgH="190440" progId="Equation.DSMT4">
                   <p:embed/>
                 </p:oleObj>
               </mc:Choice>
@@ -10327,7 +10327,7 @@
           <a:graphicData uri="http://schemas.openxmlformats.org/presentationml/2006/ole">
             <mc:AlternateContent xmlns:mc="http://schemas.openxmlformats.org/markup-compatibility/2006">
               <mc:Choice xmlns:v="urn:schemas-microsoft-com:vml" Requires="v">
-                <p:oleObj spid="_x0000_s19672" name="Equation" r:id="rId7" imgW="660240" imgH="152280" progId="Equation.DSMT4">
+                <p:oleObj spid="_x0000_s19680" name="Equation" r:id="rId7" imgW="660240" imgH="152280" progId="Equation.DSMT4">
                   <p:embed/>
                 </p:oleObj>
               </mc:Choice>
@@ -10384,7 +10384,7 @@
           <a:graphicData uri="http://schemas.openxmlformats.org/presentationml/2006/ole">
             <mc:AlternateContent xmlns:mc="http://schemas.openxmlformats.org/markup-compatibility/2006">
               <mc:Choice xmlns:v="urn:schemas-microsoft-com:vml" Requires="v">
-                <p:oleObj spid="_x0000_s19673" name="Equation" r:id="rId9" imgW="1384200" imgH="152280" progId="Equation.DSMT4">
+                <p:oleObj spid="_x0000_s19681" name="Equation" r:id="rId9" imgW="1384200" imgH="152280" progId="Equation.DSMT4">
                   <p:embed/>
                 </p:oleObj>
               </mc:Choice>
@@ -10636,25 +10636,25 @@
           <p:nvPr>
             <p:extLst>
               <p:ext uri="{D42A27DB-BD31-4B8C-83A1-F6EECF244321}">
-                <p14:modId xmlns:p14="http://schemas.microsoft.com/office/powerpoint/2010/main" val="3146403492"/>
+                <p14:modId xmlns:p14="http://schemas.microsoft.com/office/powerpoint/2010/main" val="903481774"/>
               </p:ext>
             </p:extLst>
           </p:nvPr>
         </p:nvGraphicFramePr>
         <p:xfrm>
-          <a:off x="2754424" y="1818594"/>
-          <a:ext cx="1817007" cy="368668"/>
+          <a:off x="2779713" y="1819275"/>
+          <a:ext cx="1765300" cy="368300"/>
         </p:xfrm>
         <a:graphic>
           <a:graphicData uri="http://schemas.openxmlformats.org/presentationml/2006/ole">
             <mc:AlternateContent xmlns:mc="http://schemas.openxmlformats.org/markup-compatibility/2006">
               <mc:Choice xmlns:v="urn:schemas-microsoft-com:vml" Requires="v">
-                <p:oleObj spid="_x0000_s20812" name="Equation" r:id="rId3" imgW="876240" imgH="177480" progId="Equation.DSMT4">
+                <p:oleObj spid="_x0000_s20826" name="Equation" r:id="rId3" imgW="850680" imgH="177480" progId="Equation.DSMT4">
                   <p:embed/>
                 </p:oleObj>
               </mc:Choice>
               <mc:Fallback>
-                <p:oleObj name="Equation" r:id="rId3" imgW="876240" imgH="177480" progId="Equation.DSMT4">
+                <p:oleObj name="Equation" r:id="rId3" imgW="850680" imgH="177480" progId="Equation.DSMT4">
                   <p:embed/>
                   <p:pic>
                     <p:nvPicPr>
@@ -10670,8 +10670,8 @@
                     </p:blipFill>
                     <p:spPr>
                       <a:xfrm>
-                        <a:off x="2754424" y="1818594"/>
-                        <a:ext cx="1817007" cy="368668"/>
+                        <a:off x="2779713" y="1819275"/>
+                        <a:ext cx="1765300" cy="368300"/>
                       </a:xfrm>
                       <a:prstGeom prst="rect">
                         <a:avLst/>
@@ -10706,7 +10706,7 @@
           <a:graphicData uri="http://schemas.openxmlformats.org/presentationml/2006/ole">
             <mc:AlternateContent xmlns:mc="http://schemas.openxmlformats.org/markup-compatibility/2006">
               <mc:Choice xmlns:v="urn:schemas-microsoft-com:vml" Requires="v">
-                <p:oleObj spid="_x0000_s20813" name="Equation" r:id="rId5" imgW="685800" imgH="177480" progId="Equation.DSMT4">
+                <p:oleObj spid="_x0000_s20827" name="Equation" r:id="rId5" imgW="685800" imgH="177480" progId="Equation.DSMT4">
                   <p:embed/>
                 </p:oleObj>
               </mc:Choice>
@@ -10763,7 +10763,7 @@
           <a:graphicData uri="http://schemas.openxmlformats.org/presentationml/2006/ole">
             <mc:AlternateContent xmlns:mc="http://schemas.openxmlformats.org/markup-compatibility/2006">
               <mc:Choice xmlns:v="urn:schemas-microsoft-com:vml" Requires="v">
-                <p:oleObj spid="_x0000_s20814" name="Equation" r:id="rId7" imgW="139680" imgH="177480" progId="Equation.DSMT4">
+                <p:oleObj spid="_x0000_s20828" name="Equation" r:id="rId7" imgW="139680" imgH="177480" progId="Equation.DSMT4">
                   <p:embed/>
                 </p:oleObj>
               </mc:Choice>
@@ -10820,7 +10820,7 @@
           <a:graphicData uri="http://schemas.openxmlformats.org/presentationml/2006/ole">
             <mc:AlternateContent xmlns:mc="http://schemas.openxmlformats.org/markup-compatibility/2006">
               <mc:Choice xmlns:v="urn:schemas-microsoft-com:vml" Requires="v">
-                <p:oleObj spid="_x0000_s20815" name="Equation" r:id="rId9" imgW="2171520" imgH="177480" progId="Equation.DSMT4">
+                <p:oleObj spid="_x0000_s20829" name="Equation" r:id="rId9" imgW="2171520" imgH="177480" progId="Equation.DSMT4">
                   <p:embed/>
                 </p:oleObj>
               </mc:Choice>
@@ -10877,7 +10877,7 @@
           <a:graphicData uri="http://schemas.openxmlformats.org/presentationml/2006/ole">
             <mc:AlternateContent xmlns:mc="http://schemas.openxmlformats.org/markup-compatibility/2006">
               <mc:Choice xmlns:v="urn:schemas-microsoft-com:vml" Requires="v">
-                <p:oleObj spid="_x0000_s20816" name="Equation" r:id="rId11" imgW="685800" imgH="177480" progId="Equation.DSMT4">
+                <p:oleObj spid="_x0000_s20830" name="Equation" r:id="rId11" imgW="685800" imgH="177480" progId="Equation.DSMT4">
                   <p:embed/>
                 </p:oleObj>
               </mc:Choice>
@@ -10934,7 +10934,7 @@
           <a:graphicData uri="http://schemas.openxmlformats.org/presentationml/2006/ole">
             <mc:AlternateContent xmlns:mc="http://schemas.openxmlformats.org/markup-compatibility/2006">
               <mc:Choice xmlns:v="urn:schemas-microsoft-com:vml" Requires="v">
-                <p:oleObj spid="_x0000_s20817" name="Equation" r:id="rId13" imgW="812520" imgH="152280" progId="Equation.DSMT4">
+                <p:oleObj spid="_x0000_s20831" name="Equation" r:id="rId13" imgW="812520" imgH="152280" progId="Equation.DSMT4">
                   <p:embed/>
                 </p:oleObj>
               </mc:Choice>
@@ -10991,7 +10991,7 @@
           <a:graphicData uri="http://schemas.openxmlformats.org/presentationml/2006/ole">
             <mc:AlternateContent xmlns:mc="http://schemas.openxmlformats.org/markup-compatibility/2006">
               <mc:Choice xmlns:v="urn:schemas-microsoft-com:vml" Requires="v">
-                <p:oleObj spid="_x0000_s20818" name="Equation" r:id="rId15" imgW="101520" imgH="114120" progId="Equation.DSMT4">
+                <p:oleObj spid="_x0000_s20832" name="Equation" r:id="rId15" imgW="101520" imgH="114120" progId="Equation.DSMT4">
                   <p:embed/>
                 </p:oleObj>
               </mc:Choice>
@@ -13179,7 +13179,7 @@
           <a:graphicData uri="http://schemas.openxmlformats.org/presentationml/2006/ole">
             <mc:AlternateContent xmlns:mc="http://schemas.openxmlformats.org/markup-compatibility/2006">
               <mc:Choice xmlns:v="urn:schemas-microsoft-com:vml" Requires="v">
-                <p:oleObj spid="_x0000_s23656" name="Equation" r:id="rId3" imgW="787320" imgH="1143000" progId="Equation.DSMT4">
+                <p:oleObj spid="_x0000_s23666" name="Equation" r:id="rId3" imgW="787320" imgH="1143000" progId="Equation.DSMT4">
                   <p:embed/>
                 </p:oleObj>
               </mc:Choice>
@@ -13236,7 +13236,7 @@
           <a:graphicData uri="http://schemas.openxmlformats.org/presentationml/2006/ole">
             <mc:AlternateContent xmlns:mc="http://schemas.openxmlformats.org/markup-compatibility/2006">
               <mc:Choice xmlns:v="urn:schemas-microsoft-com:vml" Requires="v">
-                <p:oleObj spid="_x0000_s23657" name="Equation" r:id="rId5" imgW="457200" imgH="482400" progId="Equation.DSMT4">
+                <p:oleObj spid="_x0000_s23667" name="Equation" r:id="rId5" imgW="457200" imgH="482400" progId="Equation.DSMT4">
                   <p:embed/>
                 </p:oleObj>
               </mc:Choice>
@@ -13293,7 +13293,7 @@
           <a:graphicData uri="http://schemas.openxmlformats.org/presentationml/2006/ole">
             <mc:AlternateContent xmlns:mc="http://schemas.openxmlformats.org/markup-compatibility/2006">
               <mc:Choice xmlns:v="urn:schemas-microsoft-com:vml" Requires="v">
-                <p:oleObj spid="_x0000_s23658" name="Equation" r:id="rId7" imgW="596880" imgH="482400" progId="Equation.DSMT4">
+                <p:oleObj spid="_x0000_s23668" name="Equation" r:id="rId7" imgW="596880" imgH="482400" progId="Equation.DSMT4">
                   <p:embed/>
                 </p:oleObj>
               </mc:Choice>
@@ -13350,7 +13350,7 @@
           <a:graphicData uri="http://schemas.openxmlformats.org/presentationml/2006/ole">
             <mc:AlternateContent xmlns:mc="http://schemas.openxmlformats.org/markup-compatibility/2006">
               <mc:Choice xmlns:v="urn:schemas-microsoft-com:vml" Requires="v">
-                <p:oleObj spid="_x0000_s23659" name="Equation" r:id="rId9" imgW="545760" imgH="482400" progId="Equation.DSMT4">
+                <p:oleObj spid="_x0000_s23669" name="Equation" r:id="rId9" imgW="545760" imgH="482400" progId="Equation.DSMT4">
                   <p:embed/>
                 </p:oleObj>
               </mc:Choice>
@@ -13407,7 +13407,7 @@
           <a:graphicData uri="http://schemas.openxmlformats.org/presentationml/2006/ole">
             <mc:AlternateContent xmlns:mc="http://schemas.openxmlformats.org/markup-compatibility/2006">
               <mc:Choice xmlns:v="urn:schemas-microsoft-com:vml" Requires="v">
-                <p:oleObj spid="_x0000_s23660" name="Equation" r:id="rId11" imgW="583920" imgH="482400" progId="Equation.DSMT4">
+                <p:oleObj spid="_x0000_s23670" name="Equation" r:id="rId11" imgW="583920" imgH="482400" progId="Equation.DSMT4">
                   <p:embed/>
                 </p:oleObj>
               </mc:Choice>
@@ -13582,7 +13582,7 @@
           <a:graphicData uri="http://schemas.openxmlformats.org/presentationml/2006/ole">
             <mc:AlternateContent xmlns:mc="http://schemas.openxmlformats.org/markup-compatibility/2006">
               <mc:Choice xmlns:v="urn:schemas-microsoft-com:vml" Requires="v">
-                <p:oleObj spid="_x0000_s24635" name="Equation" r:id="rId3" imgW="647640" imgH="634680" progId="Equation.DSMT4">
+                <p:oleObj spid="_x0000_s24641" name="Equation" r:id="rId3" imgW="647640" imgH="634680" progId="Equation.DSMT4">
                   <p:embed/>
                 </p:oleObj>
               </mc:Choice>
@@ -13639,7 +13639,7 @@
           <a:graphicData uri="http://schemas.openxmlformats.org/presentationml/2006/ole">
             <mc:AlternateContent xmlns:mc="http://schemas.openxmlformats.org/markup-compatibility/2006">
               <mc:Choice xmlns:v="urn:schemas-microsoft-com:vml" Requires="v">
-                <p:oleObj spid="_x0000_s24636" name="Equation" r:id="rId5" imgW="457200" imgH="152280" progId="Equation.DSMT4">
+                <p:oleObj spid="_x0000_s24642" name="Equation" r:id="rId5" imgW="457200" imgH="152280" progId="Equation.DSMT4">
                   <p:embed/>
                 </p:oleObj>
               </mc:Choice>
@@ -13696,7 +13696,7 @@
           <a:graphicData uri="http://schemas.openxmlformats.org/presentationml/2006/ole">
             <mc:AlternateContent xmlns:mc="http://schemas.openxmlformats.org/markup-compatibility/2006">
               <mc:Choice xmlns:v="urn:schemas-microsoft-com:vml" Requires="v">
-                <p:oleObj spid="_x0000_s24637" name="Equation" r:id="rId7" imgW="1257120" imgH="965160" progId="Equation.DSMT4">
+                <p:oleObj spid="_x0000_s24643" name="Equation" r:id="rId7" imgW="1257120" imgH="965160" progId="Equation.DSMT4">
                   <p:embed/>
                 </p:oleObj>
               </mc:Choice>
@@ -13822,7 +13822,7 @@
           <a:graphicData uri="http://schemas.openxmlformats.org/presentationml/2006/ole">
             <mc:AlternateContent xmlns:mc="http://schemas.openxmlformats.org/markup-compatibility/2006">
               <mc:Choice xmlns:v="urn:schemas-microsoft-com:vml" Requires="v">
-                <p:oleObj spid="_x0000_s21542" name="Visio" r:id="rId3" imgW="9303798" imgH="3634662" progId="Visio.Drawing.15">
+                <p:oleObj spid="_x0000_s21544" name="Visio" r:id="rId3" imgW="9303798" imgH="3634662" progId="Visio.Drawing.15">
                   <p:embed/>
                 </p:oleObj>
               </mc:Choice>
@@ -14167,7 +14167,7 @@
           <a:graphicData uri="http://schemas.openxmlformats.org/presentationml/2006/ole">
             <mc:AlternateContent xmlns:mc="http://schemas.openxmlformats.org/markup-compatibility/2006">
               <mc:Choice xmlns:v="urn:schemas-microsoft-com:vml" Requires="v">
-                <p:oleObj spid="_x0000_s3242" name="Equation" r:id="rId3" imgW="3022560" imgH="190440" progId="Equation.DSMT4">
+                <p:oleObj spid="_x0000_s3244" name="Equation" r:id="rId3" imgW="3022560" imgH="190440" progId="Equation.DSMT4">
                   <p:embed/>
                 </p:oleObj>
               </mc:Choice>
@@ -14386,7 +14386,7 @@
           <a:graphicData uri="http://schemas.openxmlformats.org/presentationml/2006/ole">
             <mc:AlternateContent xmlns:mc="http://schemas.openxmlformats.org/markup-compatibility/2006">
               <mc:Choice xmlns:v="urn:schemas-microsoft-com:vml" Requires="v">
-                <p:oleObj spid="_x0000_s22803" name="Equation" r:id="rId3" imgW="850680" imgH="228600" progId="Equation.DSMT4">
+                <p:oleObj spid="_x0000_s22819" name="Equation" r:id="rId3" imgW="850680" imgH="228600" progId="Equation.DSMT4">
                   <p:embed/>
                 </p:oleObj>
               </mc:Choice>
@@ -14443,7 +14443,7 @@
           <a:graphicData uri="http://schemas.openxmlformats.org/presentationml/2006/ole">
             <mc:AlternateContent xmlns:mc="http://schemas.openxmlformats.org/markup-compatibility/2006">
               <mc:Choice xmlns:v="urn:schemas-microsoft-com:vml" Requires="v">
-                <p:oleObj spid="_x0000_s22804" name="Equation" r:id="rId5" imgW="177480" imgH="177480" progId="Equation.DSMT4">
+                <p:oleObj spid="_x0000_s22820" name="Equation" r:id="rId5" imgW="177480" imgH="177480" progId="Equation.DSMT4">
                   <p:embed/>
                 </p:oleObj>
               </mc:Choice>
@@ -14500,7 +14500,7 @@
           <a:graphicData uri="http://schemas.openxmlformats.org/presentationml/2006/ole">
             <mc:AlternateContent xmlns:mc="http://schemas.openxmlformats.org/markup-compatibility/2006">
               <mc:Choice xmlns:v="urn:schemas-microsoft-com:vml" Requires="v">
-                <p:oleObj spid="_x0000_s22805" name="Equation" r:id="rId7" imgW="469800" imgH="177480" progId="Equation.DSMT4">
+                <p:oleObj spid="_x0000_s22821" name="Equation" r:id="rId7" imgW="469800" imgH="177480" progId="Equation.DSMT4">
                   <p:embed/>
                 </p:oleObj>
               </mc:Choice>
@@ -14557,7 +14557,7 @@
           <a:graphicData uri="http://schemas.openxmlformats.org/presentationml/2006/ole">
             <mc:AlternateContent xmlns:mc="http://schemas.openxmlformats.org/markup-compatibility/2006">
               <mc:Choice xmlns:v="urn:schemas-microsoft-com:vml" Requires="v">
-                <p:oleObj spid="_x0000_s22806" name="Equation" r:id="rId9" imgW="1384200" imgH="241200" progId="Equation.DSMT4">
+                <p:oleObj spid="_x0000_s22822" name="Equation" r:id="rId9" imgW="1384200" imgH="241200" progId="Equation.DSMT4">
                   <p:embed/>
                 </p:oleObj>
               </mc:Choice>
@@ -14614,7 +14614,7 @@
           <a:graphicData uri="http://schemas.openxmlformats.org/presentationml/2006/ole">
             <mc:AlternateContent xmlns:mc="http://schemas.openxmlformats.org/markup-compatibility/2006">
               <mc:Choice xmlns:v="urn:schemas-microsoft-com:vml" Requires="v">
-                <p:oleObj spid="_x0000_s22807" name="Equation" r:id="rId11" imgW="711000" imgH="228600" progId="Equation.DSMT4">
+                <p:oleObj spid="_x0000_s22823" name="Equation" r:id="rId11" imgW="711000" imgH="228600" progId="Equation.DSMT4">
                   <p:embed/>
                 </p:oleObj>
               </mc:Choice>
@@ -14849,7 +14849,7 @@
           <p:nvPr>
             <p:extLst>
               <p:ext uri="{D42A27DB-BD31-4B8C-83A1-F6EECF244321}">
-                <p14:modId xmlns:p14="http://schemas.microsoft.com/office/powerpoint/2010/main" val="4203723767"/>
+                <p14:modId xmlns:p14="http://schemas.microsoft.com/office/powerpoint/2010/main" val="1628415244"/>
               </p:ext>
             </p:extLst>
           </p:nvPr>
@@ -14862,7 +14862,7 @@
           <a:graphicData uri="http://schemas.openxmlformats.org/presentationml/2006/ole">
             <mc:AlternateContent xmlns:mc="http://schemas.openxmlformats.org/markup-compatibility/2006">
               <mc:Choice xmlns:v="urn:schemas-microsoft-com:vml" Requires="v">
-                <p:oleObj spid="_x0000_s22808" name="Equation" r:id="rId13" imgW="520560" imgH="914400" progId="Equation.DSMT4">
+                <p:oleObj spid="_x0000_s22824" name="Equation" r:id="rId13" imgW="520560" imgH="914400" progId="Equation.DSMT4">
                   <p:embed/>
                 </p:oleObj>
               </mc:Choice>
@@ -14944,25 +14944,25 @@
           <p:nvPr>
             <p:extLst>
               <p:ext uri="{D42A27DB-BD31-4B8C-83A1-F6EECF244321}">
-                <p14:modId xmlns:p14="http://schemas.microsoft.com/office/powerpoint/2010/main" val="3004457314"/>
+                <p14:modId xmlns:p14="http://schemas.microsoft.com/office/powerpoint/2010/main" val="3368834945"/>
               </p:ext>
             </p:extLst>
           </p:nvPr>
         </p:nvGraphicFramePr>
         <p:xfrm>
-          <a:off x="4273550" y="5110163"/>
-          <a:ext cx="2536825" cy="528637"/>
+          <a:off x="4318000" y="5110163"/>
+          <a:ext cx="2447925" cy="528637"/>
         </p:xfrm>
         <a:graphic>
           <a:graphicData uri="http://schemas.openxmlformats.org/presentationml/2006/ole">
             <mc:AlternateContent xmlns:mc="http://schemas.openxmlformats.org/markup-compatibility/2006">
               <mc:Choice xmlns:v="urn:schemas-microsoft-com:vml" Requires="v">
-                <p:oleObj spid="_x0000_s22809" name="Equation" r:id="rId15" imgW="1091880" imgH="228600" progId="Equation.DSMT4">
+                <p:oleObj spid="_x0000_s22825" name="Equation" r:id="rId15" imgW="1054080" imgH="228600" progId="Equation.DSMT4">
                   <p:embed/>
                 </p:oleObj>
               </mc:Choice>
               <mc:Fallback>
-                <p:oleObj name="Equation" r:id="rId15" imgW="1091880" imgH="228600" progId="Equation.DSMT4">
+                <p:oleObj name="Equation" r:id="rId15" imgW="1054080" imgH="228600" progId="Equation.DSMT4">
                   <p:embed/>
                   <p:pic>
                     <p:nvPicPr>
@@ -14978,8 +14978,8 @@
                     </p:blipFill>
                     <p:spPr>
                       <a:xfrm>
-                        <a:off x="4273550" y="5110163"/>
-                        <a:ext cx="2536825" cy="528637"/>
+                        <a:off x="4318000" y="5110163"/>
+                        <a:ext cx="2447925" cy="528637"/>
                       </a:xfrm>
                       <a:prstGeom prst="rect">
                         <a:avLst/>
@@ -15014,7 +15014,7 @@
           <a:graphicData uri="http://schemas.openxmlformats.org/presentationml/2006/ole">
             <mc:AlternateContent xmlns:mc="http://schemas.openxmlformats.org/markup-compatibility/2006">
               <mc:Choice xmlns:v="urn:schemas-microsoft-com:vml" Requires="v">
-                <p:oleObj spid="_x0000_s22810" name="Equation" r:id="rId17" imgW="2145960" imgH="228600" progId="Equation.DSMT4">
+                <p:oleObj spid="_x0000_s22826" name="Equation" r:id="rId17" imgW="2145960" imgH="228600" progId="Equation.DSMT4">
                   <p:embed/>
                 </p:oleObj>
               </mc:Choice>
@@ -15176,7 +15176,7 @@
           <a:graphicData uri="http://schemas.openxmlformats.org/presentationml/2006/ole">
             <mc:AlternateContent xmlns:mc="http://schemas.openxmlformats.org/markup-compatibility/2006">
               <mc:Choice xmlns:v="urn:schemas-microsoft-com:vml" Requires="v">
-                <p:oleObj spid="_x0000_s9841" name="Equation" r:id="rId3" imgW="647640" imgH="177480" progId="Equation.DSMT4">
+                <p:oleObj spid="_x0000_s9851" name="Equation" r:id="rId3" imgW="647640" imgH="177480" progId="Equation.DSMT4">
                   <p:embed/>
                 </p:oleObj>
               </mc:Choice>
@@ -15720,7 +15720,7 @@
           <a:graphicData uri="http://schemas.openxmlformats.org/presentationml/2006/ole">
             <mc:AlternateContent xmlns:mc="http://schemas.openxmlformats.org/markup-compatibility/2006">
               <mc:Choice xmlns:v="urn:schemas-microsoft-com:vml" Requires="v">
-                <p:oleObj spid="_x0000_s9842" name="Equation" r:id="rId5" imgW="126720" imgH="139680" progId="Equation.DSMT4">
+                <p:oleObj spid="_x0000_s9852" name="Equation" r:id="rId5" imgW="126720" imgH="139680" progId="Equation.DSMT4">
                   <p:embed/>
                 </p:oleObj>
               </mc:Choice>
@@ -15777,7 +15777,7 @@
           <a:graphicData uri="http://schemas.openxmlformats.org/presentationml/2006/ole">
             <mc:AlternateContent xmlns:mc="http://schemas.openxmlformats.org/markup-compatibility/2006">
               <mc:Choice xmlns:v="urn:schemas-microsoft-com:vml" Requires="v">
-                <p:oleObj spid="_x0000_s9843" name="Equation" r:id="rId7" imgW="1041120" imgH="228600" progId="Equation.DSMT4">
+                <p:oleObj spid="_x0000_s9853" name="Equation" r:id="rId7" imgW="1041120" imgH="228600" progId="Equation.DSMT4">
                   <p:embed/>
                 </p:oleObj>
               </mc:Choice>
@@ -15834,7 +15834,7 @@
           <a:graphicData uri="http://schemas.openxmlformats.org/presentationml/2006/ole">
             <mc:AlternateContent xmlns:mc="http://schemas.openxmlformats.org/markup-compatibility/2006">
               <mc:Choice xmlns:v="urn:schemas-microsoft-com:vml" Requires="v">
-                <p:oleObj spid="_x0000_s9844" name="Equation" r:id="rId9" imgW="444240" imgH="177480" progId="Equation.DSMT4">
+                <p:oleObj spid="_x0000_s9854" name="Equation" r:id="rId9" imgW="444240" imgH="177480" progId="Equation.DSMT4">
                   <p:embed/>
                 </p:oleObj>
               </mc:Choice>
@@ -15891,7 +15891,7 @@
           <a:graphicData uri="http://schemas.openxmlformats.org/presentationml/2006/ole">
             <mc:AlternateContent xmlns:mc="http://schemas.openxmlformats.org/markup-compatibility/2006">
               <mc:Choice xmlns:v="urn:schemas-microsoft-com:vml" Requires="v">
-                <p:oleObj spid="_x0000_s9845" name="Equation" r:id="rId11" imgW="126720" imgH="139680" progId="Equation.DSMT4">
+                <p:oleObj spid="_x0000_s9855" name="Equation" r:id="rId11" imgW="126720" imgH="139680" progId="Equation.DSMT4">
                   <p:embed/>
                 </p:oleObj>
               </mc:Choice>
@@ -16330,7 +16330,7 @@
           <a:graphicData uri="http://schemas.openxmlformats.org/presentationml/2006/ole">
             <mc:AlternateContent xmlns:mc="http://schemas.openxmlformats.org/markup-compatibility/2006">
               <mc:Choice xmlns:v="urn:schemas-microsoft-com:vml" Requires="v">
-                <p:oleObj spid="_x0000_s10344" name="Equation" r:id="rId3" imgW="469800" imgH="164880" progId="Equation.DSMT4">
+                <p:oleObj spid="_x0000_s10346" name="Equation" r:id="rId3" imgW="469800" imgH="164880" progId="Equation.DSMT4">
                   <p:embed/>
                 </p:oleObj>
               </mc:Choice>
@@ -17214,132 +17214,6 @@
 </file>
 
 <file path=customXml/item2.xml><?xml version="1.0" encoding="utf-8"?>
-<p:properties xmlns:p="http://schemas.microsoft.com/office/2006/metadata/properties" xmlns:xsi="http://www.w3.org/2001/XMLSchema-instance" xmlns:pc="http://schemas.microsoft.com/office/infopath/2007/PartnerControls">
-  <documentManagement>
-    <APDescription xmlns="4873beb7-5857-4685-be1f-d57550cc96cc" xsi:nil="true"/>
-    <AssetExpire xmlns="4873beb7-5857-4685-be1f-d57550cc96cc">2029-01-01T08:00:00+00:00</AssetExpire>
-    <CampaignTagsTaxHTField0 xmlns="4873beb7-5857-4685-be1f-d57550cc96cc">
-      <Terms xmlns="http://schemas.microsoft.com/office/infopath/2007/PartnerControls"/>
-    </CampaignTagsTaxHTField0>
-    <IntlLangReviewDate xmlns="4873beb7-5857-4685-be1f-d57550cc96cc" xsi:nil="true"/>
-    <TPFriendlyName xmlns="4873beb7-5857-4685-be1f-d57550cc96cc" xsi:nil="true"/>
-    <IntlLangReview xmlns="4873beb7-5857-4685-be1f-d57550cc96cc">false</IntlLangReview>
-    <LocLastLocAttemptVersionLookup xmlns="4873beb7-5857-4685-be1f-d57550cc96cc">855024</LocLastLocAttemptVersionLookup>
-    <PolicheckWords xmlns="4873beb7-5857-4685-be1f-d57550cc96cc" xsi:nil="true"/>
-    <SubmitterId xmlns="4873beb7-5857-4685-be1f-d57550cc96cc" xsi:nil="true"/>
-    <AcquiredFrom xmlns="4873beb7-5857-4685-be1f-d57550cc96cc">Internal MS</AcquiredFrom>
-    <EditorialStatus xmlns="4873beb7-5857-4685-be1f-d57550cc96cc">Complete</EditorialStatus>
-    <Markets xmlns="4873beb7-5857-4685-be1f-d57550cc96cc"/>
-    <OriginAsset xmlns="4873beb7-5857-4685-be1f-d57550cc96cc" xsi:nil="true"/>
-    <AssetStart xmlns="4873beb7-5857-4685-be1f-d57550cc96cc">2012-08-31T08:50:00+00:00</AssetStart>
-    <FriendlyTitle xmlns="4873beb7-5857-4685-be1f-d57550cc96cc" xsi:nil="true"/>
-    <MarketSpecific xmlns="4873beb7-5857-4685-be1f-d57550cc96cc">false</MarketSpecific>
-    <TPNamespace xmlns="4873beb7-5857-4685-be1f-d57550cc96cc" xsi:nil="true"/>
-    <PublishStatusLookup xmlns="4873beb7-5857-4685-be1f-d57550cc96cc">
-      <Value>1616423</Value>
-    </PublishStatusLookup>
-    <APAuthor xmlns="4873beb7-5857-4685-be1f-d57550cc96cc">
-      <UserInfo>
-        <DisplayName>REDMOND\kristaa</DisplayName>
-        <AccountId>136</AccountId>
-        <AccountType/>
-      </UserInfo>
-    </APAuthor>
-    <TPCommandLine xmlns="4873beb7-5857-4685-be1f-d57550cc96cc" xsi:nil="true"/>
-    <IntlLangReviewer xmlns="4873beb7-5857-4685-be1f-d57550cc96cc" xsi:nil="true"/>
-    <OpenTemplate xmlns="4873beb7-5857-4685-be1f-d57550cc96cc">true</OpenTemplate>
-    <CSXSubmissionDate xmlns="4873beb7-5857-4685-be1f-d57550cc96cc" xsi:nil="true"/>
-    <TaxCatchAll xmlns="4873beb7-5857-4685-be1f-d57550cc96cc"/>
-    <Manager xmlns="4873beb7-5857-4685-be1f-d57550cc96cc" xsi:nil="true"/>
-    <NumericId xmlns="4873beb7-5857-4685-be1f-d57550cc96cc" xsi:nil="true"/>
-    <ParentAssetId xmlns="4873beb7-5857-4685-be1f-d57550cc96cc" xsi:nil="true"/>
-    <OriginalSourceMarket xmlns="4873beb7-5857-4685-be1f-d57550cc96cc" xsi:nil="true"/>
-    <ApprovalStatus xmlns="4873beb7-5857-4685-be1f-d57550cc96cc">InProgress</ApprovalStatus>
-    <TPComponent xmlns="4873beb7-5857-4685-be1f-d57550cc96cc" xsi:nil="true"/>
-    <EditorialTags xmlns="4873beb7-5857-4685-be1f-d57550cc96cc" xsi:nil="true"/>
-    <TPExecutable xmlns="4873beb7-5857-4685-be1f-d57550cc96cc" xsi:nil="true"/>
-    <TPLaunchHelpLink xmlns="4873beb7-5857-4685-be1f-d57550cc96cc" xsi:nil="true"/>
-    <LocComments xmlns="4873beb7-5857-4685-be1f-d57550cc96cc" xsi:nil="true"/>
-    <LocRecommendedHandoff xmlns="4873beb7-5857-4685-be1f-d57550cc96cc" xsi:nil="true"/>
-    <SourceTitle xmlns="4873beb7-5857-4685-be1f-d57550cc96cc" xsi:nil="true"/>
-    <CSXUpdate xmlns="4873beb7-5857-4685-be1f-d57550cc96cc">false</CSXUpdate>
-    <IntlLocPriority xmlns="4873beb7-5857-4685-be1f-d57550cc96cc" xsi:nil="true"/>
-    <UAProjectedTotalWords xmlns="4873beb7-5857-4685-be1f-d57550cc96cc" xsi:nil="true"/>
-    <AssetType xmlns="4873beb7-5857-4685-be1f-d57550cc96cc">TP</AssetType>
-    <MachineTranslated xmlns="4873beb7-5857-4685-be1f-d57550cc96cc">false</MachineTranslated>
-    <OutputCachingOn xmlns="4873beb7-5857-4685-be1f-d57550cc96cc">false</OutputCachingOn>
-    <TemplateStatus xmlns="4873beb7-5857-4685-be1f-d57550cc96cc">Complete</TemplateStatus>
-    <IsSearchable xmlns="4873beb7-5857-4685-be1f-d57550cc96cc">true</IsSearchable>
-    <ContentItem xmlns="4873beb7-5857-4685-be1f-d57550cc96cc" xsi:nil="true"/>
-    <HandoffToMSDN xmlns="4873beb7-5857-4685-be1f-d57550cc96cc" xsi:nil="true"/>
-    <ShowIn xmlns="4873beb7-5857-4685-be1f-d57550cc96cc">Show everywhere</ShowIn>
-    <ThumbnailAssetId xmlns="4873beb7-5857-4685-be1f-d57550cc96cc" xsi:nil="true"/>
-    <UALocComments xmlns="4873beb7-5857-4685-be1f-d57550cc96cc" xsi:nil="true"/>
-    <UALocRecommendation xmlns="4873beb7-5857-4685-be1f-d57550cc96cc">Localize</UALocRecommendation>
-    <LastModifiedDateTime xmlns="4873beb7-5857-4685-be1f-d57550cc96cc" xsi:nil="true"/>
-    <LegacyData xmlns="4873beb7-5857-4685-be1f-d57550cc96cc" xsi:nil="true"/>
-    <LocManualTestRequired xmlns="4873beb7-5857-4685-be1f-d57550cc96cc">false</LocManualTestRequired>
-    <LocMarketGroupTiers2 xmlns="4873beb7-5857-4685-be1f-d57550cc96cc" xsi:nil="true"/>
-    <ClipArtFilename xmlns="4873beb7-5857-4685-be1f-d57550cc96cc" xsi:nil="true"/>
-    <TPApplication xmlns="4873beb7-5857-4685-be1f-d57550cc96cc" xsi:nil="true"/>
-    <CSXHash xmlns="4873beb7-5857-4685-be1f-d57550cc96cc" xsi:nil="true"/>
-    <DirectSourceMarket xmlns="4873beb7-5857-4685-be1f-d57550cc96cc" xsi:nil="true"/>
-    <PrimaryImageGen xmlns="4873beb7-5857-4685-be1f-d57550cc96cc">true</PrimaryImageGen>
-    <PlannedPubDate xmlns="4873beb7-5857-4685-be1f-d57550cc96cc" xsi:nil="true"/>
-    <CSXSubmissionMarket xmlns="4873beb7-5857-4685-be1f-d57550cc96cc" xsi:nil="true"/>
-    <Downloads xmlns="4873beb7-5857-4685-be1f-d57550cc96cc">0</Downloads>
-    <ArtSampleDocs xmlns="4873beb7-5857-4685-be1f-d57550cc96cc" xsi:nil="true"/>
-    <TrustLevel xmlns="4873beb7-5857-4685-be1f-d57550cc96cc">1 Microsoft Managed Content</TrustLevel>
-    <BlockPublish xmlns="4873beb7-5857-4685-be1f-d57550cc96cc">false</BlockPublish>
-    <TPLaunchHelpLinkType xmlns="4873beb7-5857-4685-be1f-d57550cc96cc">Template</TPLaunchHelpLinkType>
-    <LocalizationTagsTaxHTField0 xmlns="4873beb7-5857-4685-be1f-d57550cc96cc">
-      <Terms xmlns="http://schemas.microsoft.com/office/infopath/2007/PartnerControls"/>
-    </LocalizationTagsTaxHTField0>
-    <BusinessGroup xmlns="4873beb7-5857-4685-be1f-d57550cc96cc" xsi:nil="true"/>
-    <Providers xmlns="4873beb7-5857-4685-be1f-d57550cc96cc" xsi:nil="true"/>
-    <TemplateTemplateType xmlns="4873beb7-5857-4685-be1f-d57550cc96cc">PowerPoint Presentation Template</TemplateTemplateType>
-    <TimesCloned xmlns="4873beb7-5857-4685-be1f-d57550cc96cc" xsi:nil="true"/>
-    <TPAppVersion xmlns="4873beb7-5857-4685-be1f-d57550cc96cc" xsi:nil="true"/>
-    <VoteCount xmlns="4873beb7-5857-4685-be1f-d57550cc96cc" xsi:nil="true"/>
-    <AverageRating xmlns="4873beb7-5857-4685-be1f-d57550cc96cc" xsi:nil="true"/>
-    <FeatureTagsTaxHTField0 xmlns="4873beb7-5857-4685-be1f-d57550cc96cc">
-      <Terms xmlns="http://schemas.microsoft.com/office/infopath/2007/PartnerControls"/>
-    </FeatureTagsTaxHTField0>
-    <Provider xmlns="4873beb7-5857-4685-be1f-d57550cc96cc" xsi:nil="true"/>
-    <UACurrentWords xmlns="4873beb7-5857-4685-be1f-d57550cc96cc" xsi:nil="true"/>
-    <AssetId xmlns="4873beb7-5857-4685-be1f-d57550cc96cc">TP103431361</AssetId>
-    <TPClientViewer xmlns="4873beb7-5857-4685-be1f-d57550cc96cc" xsi:nil="true"/>
-    <DSATActionTaken xmlns="4873beb7-5857-4685-be1f-d57550cc96cc" xsi:nil="true"/>
-    <APEditor xmlns="4873beb7-5857-4685-be1f-d57550cc96cc">
-      <UserInfo>
-        <DisplayName/>
-        <AccountId xsi:nil="true"/>
-        <AccountType/>
-      </UserInfo>
-    </APEditor>
-    <TPInstallLocation xmlns="4873beb7-5857-4685-be1f-d57550cc96cc" xsi:nil="true"/>
-    <OOCacheId xmlns="4873beb7-5857-4685-be1f-d57550cc96cc" xsi:nil="true"/>
-    <IsDeleted xmlns="4873beb7-5857-4685-be1f-d57550cc96cc">false</IsDeleted>
-    <PublishTargets xmlns="4873beb7-5857-4685-be1f-d57550cc96cc">OfficeOnlineVNext</PublishTargets>
-    <ApprovalLog xmlns="4873beb7-5857-4685-be1f-d57550cc96cc" xsi:nil="true"/>
-    <BugNumber xmlns="4873beb7-5857-4685-be1f-d57550cc96cc" xsi:nil="true"/>
-    <CrawlForDependencies xmlns="4873beb7-5857-4685-be1f-d57550cc96cc">false</CrawlForDependencies>
-    <InternalTagsTaxHTField0 xmlns="4873beb7-5857-4685-be1f-d57550cc96cc">
-      <Terms xmlns="http://schemas.microsoft.com/office/infopath/2007/PartnerControls"/>
-    </InternalTagsTaxHTField0>
-    <LastHandOff xmlns="4873beb7-5857-4685-be1f-d57550cc96cc" xsi:nil="true"/>
-    <Milestone xmlns="4873beb7-5857-4685-be1f-d57550cc96cc" xsi:nil="true"/>
-    <OriginalRelease xmlns="4873beb7-5857-4685-be1f-d57550cc96cc">15</OriginalRelease>
-    <RecommendationsModifier xmlns="4873beb7-5857-4685-be1f-d57550cc96cc" xsi:nil="true"/>
-    <ScenarioTagsTaxHTField0 xmlns="4873beb7-5857-4685-be1f-d57550cc96cc">
-      <Terms xmlns="http://schemas.microsoft.com/office/infopath/2007/PartnerControls"/>
-    </ScenarioTagsTaxHTField0>
-    <UANotes xmlns="4873beb7-5857-4685-be1f-d57550cc96cc" xsi:nil="true"/>
-  </documentManagement>
-</p:properties>
-</file>
-
-<file path=customXml/item3.xml><?xml version="1.0" encoding="utf-8"?>
 <ct:contentTypeSchema xmlns:ct="http://schemas.microsoft.com/office/2006/metadata/contentType" xmlns:ma="http://schemas.microsoft.com/office/2006/metadata/properties/metaAttributes" ct:_="" ma:_="" ma:contentTypeName="TemplateFile" ma:contentTypeID="0x0101006EDDDB5EE6D98C44930B742096920B300400F5B6D36B3EF94B4E9A635CDF2A18F5B8" ma:contentTypeVersion="72" ma:contentTypeDescription="Create a new document." ma:contentTypeScope="" ma:versionID="a23e56308344d904b51738559c3d67c9">
   <xsd:schema xmlns:xsd="http://www.w3.org/2001/XMLSchema" xmlns:xs="http://www.w3.org/2001/XMLSchema" xmlns:p="http://schemas.microsoft.com/office/2006/metadata/properties" xmlns:ns2="4873beb7-5857-4685-be1f-d57550cc96cc" targetNamespace="http://schemas.microsoft.com/office/2006/metadata/properties" ma:root="true" ma:fieldsID="cd0908cc4600e77bf5da051303e00c8d" ns2:_="">
     <xsd:import namespace="4873beb7-5857-4685-be1f-d57550cc96cc"/>
@@ -18379,6 +18253,132 @@
 </ct:contentTypeSchema>
 </file>
 
+<file path=customXml/item3.xml><?xml version="1.0" encoding="utf-8"?>
+<p:properties xmlns:p="http://schemas.microsoft.com/office/2006/metadata/properties" xmlns:xsi="http://www.w3.org/2001/XMLSchema-instance" xmlns:pc="http://schemas.microsoft.com/office/infopath/2007/PartnerControls">
+  <documentManagement>
+    <APDescription xmlns="4873beb7-5857-4685-be1f-d57550cc96cc" xsi:nil="true"/>
+    <AssetExpire xmlns="4873beb7-5857-4685-be1f-d57550cc96cc">2029-01-01T08:00:00+00:00</AssetExpire>
+    <CampaignTagsTaxHTField0 xmlns="4873beb7-5857-4685-be1f-d57550cc96cc">
+      <Terms xmlns="http://schemas.microsoft.com/office/infopath/2007/PartnerControls"/>
+    </CampaignTagsTaxHTField0>
+    <IntlLangReviewDate xmlns="4873beb7-5857-4685-be1f-d57550cc96cc" xsi:nil="true"/>
+    <TPFriendlyName xmlns="4873beb7-5857-4685-be1f-d57550cc96cc" xsi:nil="true"/>
+    <IntlLangReview xmlns="4873beb7-5857-4685-be1f-d57550cc96cc">false</IntlLangReview>
+    <LocLastLocAttemptVersionLookup xmlns="4873beb7-5857-4685-be1f-d57550cc96cc">855024</LocLastLocAttemptVersionLookup>
+    <PolicheckWords xmlns="4873beb7-5857-4685-be1f-d57550cc96cc" xsi:nil="true"/>
+    <SubmitterId xmlns="4873beb7-5857-4685-be1f-d57550cc96cc" xsi:nil="true"/>
+    <AcquiredFrom xmlns="4873beb7-5857-4685-be1f-d57550cc96cc">Internal MS</AcquiredFrom>
+    <EditorialStatus xmlns="4873beb7-5857-4685-be1f-d57550cc96cc">Complete</EditorialStatus>
+    <Markets xmlns="4873beb7-5857-4685-be1f-d57550cc96cc"/>
+    <OriginAsset xmlns="4873beb7-5857-4685-be1f-d57550cc96cc" xsi:nil="true"/>
+    <AssetStart xmlns="4873beb7-5857-4685-be1f-d57550cc96cc">2012-08-31T08:50:00+00:00</AssetStart>
+    <FriendlyTitle xmlns="4873beb7-5857-4685-be1f-d57550cc96cc" xsi:nil="true"/>
+    <MarketSpecific xmlns="4873beb7-5857-4685-be1f-d57550cc96cc">false</MarketSpecific>
+    <TPNamespace xmlns="4873beb7-5857-4685-be1f-d57550cc96cc" xsi:nil="true"/>
+    <PublishStatusLookup xmlns="4873beb7-5857-4685-be1f-d57550cc96cc">
+      <Value>1616423</Value>
+    </PublishStatusLookup>
+    <APAuthor xmlns="4873beb7-5857-4685-be1f-d57550cc96cc">
+      <UserInfo>
+        <DisplayName>REDMOND\kristaa</DisplayName>
+        <AccountId>136</AccountId>
+        <AccountType/>
+      </UserInfo>
+    </APAuthor>
+    <TPCommandLine xmlns="4873beb7-5857-4685-be1f-d57550cc96cc" xsi:nil="true"/>
+    <IntlLangReviewer xmlns="4873beb7-5857-4685-be1f-d57550cc96cc" xsi:nil="true"/>
+    <OpenTemplate xmlns="4873beb7-5857-4685-be1f-d57550cc96cc">true</OpenTemplate>
+    <CSXSubmissionDate xmlns="4873beb7-5857-4685-be1f-d57550cc96cc" xsi:nil="true"/>
+    <TaxCatchAll xmlns="4873beb7-5857-4685-be1f-d57550cc96cc"/>
+    <Manager xmlns="4873beb7-5857-4685-be1f-d57550cc96cc" xsi:nil="true"/>
+    <NumericId xmlns="4873beb7-5857-4685-be1f-d57550cc96cc" xsi:nil="true"/>
+    <ParentAssetId xmlns="4873beb7-5857-4685-be1f-d57550cc96cc" xsi:nil="true"/>
+    <OriginalSourceMarket xmlns="4873beb7-5857-4685-be1f-d57550cc96cc" xsi:nil="true"/>
+    <ApprovalStatus xmlns="4873beb7-5857-4685-be1f-d57550cc96cc">InProgress</ApprovalStatus>
+    <TPComponent xmlns="4873beb7-5857-4685-be1f-d57550cc96cc" xsi:nil="true"/>
+    <EditorialTags xmlns="4873beb7-5857-4685-be1f-d57550cc96cc" xsi:nil="true"/>
+    <TPExecutable xmlns="4873beb7-5857-4685-be1f-d57550cc96cc" xsi:nil="true"/>
+    <TPLaunchHelpLink xmlns="4873beb7-5857-4685-be1f-d57550cc96cc" xsi:nil="true"/>
+    <LocComments xmlns="4873beb7-5857-4685-be1f-d57550cc96cc" xsi:nil="true"/>
+    <LocRecommendedHandoff xmlns="4873beb7-5857-4685-be1f-d57550cc96cc" xsi:nil="true"/>
+    <SourceTitle xmlns="4873beb7-5857-4685-be1f-d57550cc96cc" xsi:nil="true"/>
+    <CSXUpdate xmlns="4873beb7-5857-4685-be1f-d57550cc96cc">false</CSXUpdate>
+    <IntlLocPriority xmlns="4873beb7-5857-4685-be1f-d57550cc96cc" xsi:nil="true"/>
+    <UAProjectedTotalWords xmlns="4873beb7-5857-4685-be1f-d57550cc96cc" xsi:nil="true"/>
+    <AssetType xmlns="4873beb7-5857-4685-be1f-d57550cc96cc">TP</AssetType>
+    <MachineTranslated xmlns="4873beb7-5857-4685-be1f-d57550cc96cc">false</MachineTranslated>
+    <OutputCachingOn xmlns="4873beb7-5857-4685-be1f-d57550cc96cc">false</OutputCachingOn>
+    <TemplateStatus xmlns="4873beb7-5857-4685-be1f-d57550cc96cc">Complete</TemplateStatus>
+    <IsSearchable xmlns="4873beb7-5857-4685-be1f-d57550cc96cc">true</IsSearchable>
+    <ContentItem xmlns="4873beb7-5857-4685-be1f-d57550cc96cc" xsi:nil="true"/>
+    <HandoffToMSDN xmlns="4873beb7-5857-4685-be1f-d57550cc96cc" xsi:nil="true"/>
+    <ShowIn xmlns="4873beb7-5857-4685-be1f-d57550cc96cc">Show everywhere</ShowIn>
+    <ThumbnailAssetId xmlns="4873beb7-5857-4685-be1f-d57550cc96cc" xsi:nil="true"/>
+    <UALocComments xmlns="4873beb7-5857-4685-be1f-d57550cc96cc" xsi:nil="true"/>
+    <UALocRecommendation xmlns="4873beb7-5857-4685-be1f-d57550cc96cc">Localize</UALocRecommendation>
+    <LastModifiedDateTime xmlns="4873beb7-5857-4685-be1f-d57550cc96cc" xsi:nil="true"/>
+    <LegacyData xmlns="4873beb7-5857-4685-be1f-d57550cc96cc" xsi:nil="true"/>
+    <LocManualTestRequired xmlns="4873beb7-5857-4685-be1f-d57550cc96cc">false</LocManualTestRequired>
+    <LocMarketGroupTiers2 xmlns="4873beb7-5857-4685-be1f-d57550cc96cc" xsi:nil="true"/>
+    <ClipArtFilename xmlns="4873beb7-5857-4685-be1f-d57550cc96cc" xsi:nil="true"/>
+    <TPApplication xmlns="4873beb7-5857-4685-be1f-d57550cc96cc" xsi:nil="true"/>
+    <CSXHash xmlns="4873beb7-5857-4685-be1f-d57550cc96cc" xsi:nil="true"/>
+    <DirectSourceMarket xmlns="4873beb7-5857-4685-be1f-d57550cc96cc" xsi:nil="true"/>
+    <PrimaryImageGen xmlns="4873beb7-5857-4685-be1f-d57550cc96cc">true</PrimaryImageGen>
+    <PlannedPubDate xmlns="4873beb7-5857-4685-be1f-d57550cc96cc" xsi:nil="true"/>
+    <CSXSubmissionMarket xmlns="4873beb7-5857-4685-be1f-d57550cc96cc" xsi:nil="true"/>
+    <Downloads xmlns="4873beb7-5857-4685-be1f-d57550cc96cc">0</Downloads>
+    <ArtSampleDocs xmlns="4873beb7-5857-4685-be1f-d57550cc96cc" xsi:nil="true"/>
+    <TrustLevel xmlns="4873beb7-5857-4685-be1f-d57550cc96cc">1 Microsoft Managed Content</TrustLevel>
+    <BlockPublish xmlns="4873beb7-5857-4685-be1f-d57550cc96cc">false</BlockPublish>
+    <TPLaunchHelpLinkType xmlns="4873beb7-5857-4685-be1f-d57550cc96cc">Template</TPLaunchHelpLinkType>
+    <LocalizationTagsTaxHTField0 xmlns="4873beb7-5857-4685-be1f-d57550cc96cc">
+      <Terms xmlns="http://schemas.microsoft.com/office/infopath/2007/PartnerControls"/>
+    </LocalizationTagsTaxHTField0>
+    <BusinessGroup xmlns="4873beb7-5857-4685-be1f-d57550cc96cc" xsi:nil="true"/>
+    <Providers xmlns="4873beb7-5857-4685-be1f-d57550cc96cc" xsi:nil="true"/>
+    <TemplateTemplateType xmlns="4873beb7-5857-4685-be1f-d57550cc96cc">PowerPoint Presentation Template</TemplateTemplateType>
+    <TimesCloned xmlns="4873beb7-5857-4685-be1f-d57550cc96cc" xsi:nil="true"/>
+    <TPAppVersion xmlns="4873beb7-5857-4685-be1f-d57550cc96cc" xsi:nil="true"/>
+    <VoteCount xmlns="4873beb7-5857-4685-be1f-d57550cc96cc" xsi:nil="true"/>
+    <AverageRating xmlns="4873beb7-5857-4685-be1f-d57550cc96cc" xsi:nil="true"/>
+    <FeatureTagsTaxHTField0 xmlns="4873beb7-5857-4685-be1f-d57550cc96cc">
+      <Terms xmlns="http://schemas.microsoft.com/office/infopath/2007/PartnerControls"/>
+    </FeatureTagsTaxHTField0>
+    <Provider xmlns="4873beb7-5857-4685-be1f-d57550cc96cc" xsi:nil="true"/>
+    <UACurrentWords xmlns="4873beb7-5857-4685-be1f-d57550cc96cc" xsi:nil="true"/>
+    <AssetId xmlns="4873beb7-5857-4685-be1f-d57550cc96cc">TP103431361</AssetId>
+    <TPClientViewer xmlns="4873beb7-5857-4685-be1f-d57550cc96cc" xsi:nil="true"/>
+    <DSATActionTaken xmlns="4873beb7-5857-4685-be1f-d57550cc96cc" xsi:nil="true"/>
+    <APEditor xmlns="4873beb7-5857-4685-be1f-d57550cc96cc">
+      <UserInfo>
+        <DisplayName/>
+        <AccountId xsi:nil="true"/>
+        <AccountType/>
+      </UserInfo>
+    </APEditor>
+    <TPInstallLocation xmlns="4873beb7-5857-4685-be1f-d57550cc96cc" xsi:nil="true"/>
+    <OOCacheId xmlns="4873beb7-5857-4685-be1f-d57550cc96cc" xsi:nil="true"/>
+    <IsDeleted xmlns="4873beb7-5857-4685-be1f-d57550cc96cc">false</IsDeleted>
+    <PublishTargets xmlns="4873beb7-5857-4685-be1f-d57550cc96cc">OfficeOnlineVNext</PublishTargets>
+    <ApprovalLog xmlns="4873beb7-5857-4685-be1f-d57550cc96cc" xsi:nil="true"/>
+    <BugNumber xmlns="4873beb7-5857-4685-be1f-d57550cc96cc" xsi:nil="true"/>
+    <CrawlForDependencies xmlns="4873beb7-5857-4685-be1f-d57550cc96cc">false</CrawlForDependencies>
+    <InternalTagsTaxHTField0 xmlns="4873beb7-5857-4685-be1f-d57550cc96cc">
+      <Terms xmlns="http://schemas.microsoft.com/office/infopath/2007/PartnerControls"/>
+    </InternalTagsTaxHTField0>
+    <LastHandOff xmlns="4873beb7-5857-4685-be1f-d57550cc96cc" xsi:nil="true"/>
+    <Milestone xmlns="4873beb7-5857-4685-be1f-d57550cc96cc" xsi:nil="true"/>
+    <OriginalRelease xmlns="4873beb7-5857-4685-be1f-d57550cc96cc">15</OriginalRelease>
+    <RecommendationsModifier xmlns="4873beb7-5857-4685-be1f-d57550cc96cc" xsi:nil="true"/>
+    <ScenarioTagsTaxHTField0 xmlns="4873beb7-5857-4685-be1f-d57550cc96cc">
+      <Terms xmlns="http://schemas.microsoft.com/office/infopath/2007/PartnerControls"/>
+    </ScenarioTagsTaxHTField0>
+    <UANotes xmlns="4873beb7-5857-4685-be1f-d57550cc96cc" xsi:nil="true"/>
+  </documentManagement>
+</p:properties>
+</file>
+
 <file path=customXml/itemProps1.xml><?xml version="1.0" encoding="utf-8"?>
 <ds:datastoreItem xmlns:ds="http://schemas.openxmlformats.org/officeDocument/2006/customXml" ds:itemID="{561E720F-F05D-4536-9C34-0CFCED65D3B7}">
   <ds:schemaRefs>
@@ -18388,22 +18388,6 @@
 </file>
 
 <file path=customXml/itemProps2.xml><?xml version="1.0" encoding="utf-8"?>
-<ds:datastoreItem xmlns:ds="http://schemas.openxmlformats.org/officeDocument/2006/customXml" ds:itemID="{8CDDBB83-77C1-4099-A0AA-289882E745E2}">
-  <ds:schemaRefs>
-    <ds:schemaRef ds:uri="http://schemas.microsoft.com/office/infopath/2007/PartnerControls"/>
-    <ds:schemaRef ds:uri="http://purl.org/dc/dcmitype/"/>
-    <ds:schemaRef ds:uri="http://purl.org/dc/elements/1.1/"/>
-    <ds:schemaRef ds:uri="4873beb7-5857-4685-be1f-d57550cc96cc"/>
-    <ds:schemaRef ds:uri="http://schemas.microsoft.com/office/2006/documentManagement/types"/>
-    <ds:schemaRef ds:uri="http://purl.org/dc/terms/"/>
-    <ds:schemaRef ds:uri="http://schemas.openxmlformats.org/package/2006/metadata/core-properties"/>
-    <ds:schemaRef ds:uri="http://schemas.microsoft.com/office/2006/metadata/properties"/>
-    <ds:schemaRef ds:uri="http://www.w3.org/XML/1998/namespace"/>
-  </ds:schemaRefs>
-</ds:datastoreItem>
-</file>
-
-<file path=customXml/itemProps3.xml><?xml version="1.0" encoding="utf-8"?>
 <ds:datastoreItem xmlns:ds="http://schemas.openxmlformats.org/officeDocument/2006/customXml" ds:itemID="{28C8B9CA-0273-4370-889A-FC05DA5C2FA5}">
   <ds:schemaRefs>
     <ds:schemaRef ds:uri="http://schemas.microsoft.com/office/2006/metadata/contentType"/>
@@ -18419,4 +18403,20 @@
     <ds:schemaRef ds:uri="http://schemas.microsoft.com/internal/obd"/>
   </ds:schemaRefs>
 </ds:datastoreItem>
+</file>
+
+<file path=customXml/itemProps3.xml><?xml version="1.0" encoding="utf-8"?>
+<ds:datastoreItem xmlns:ds="http://schemas.openxmlformats.org/officeDocument/2006/customXml" ds:itemID="{8CDDBB83-77C1-4099-A0AA-289882E745E2}">
+  <ds:schemaRefs>
+    <ds:schemaRef ds:uri="http://schemas.microsoft.com/office/infopath/2007/PartnerControls"/>
+    <ds:schemaRef ds:uri="http://purl.org/dc/dcmitype/"/>
+    <ds:schemaRef ds:uri="http://purl.org/dc/elements/1.1/"/>
+    <ds:schemaRef ds:uri="4873beb7-5857-4685-be1f-d57550cc96cc"/>
+    <ds:schemaRef ds:uri="http://schemas.microsoft.com/office/2006/documentManagement/types"/>
+    <ds:schemaRef ds:uri="http://purl.org/dc/terms/"/>
+    <ds:schemaRef ds:uri="http://schemas.openxmlformats.org/package/2006/metadata/core-properties"/>
+    <ds:schemaRef ds:uri="http://schemas.microsoft.com/office/2006/metadata/properties"/>
+    <ds:schemaRef ds:uri="http://www.w3.org/XML/1998/namespace"/>
+  </ds:schemaRefs>
+</ds:datastoreItem>
 </file>
</xml_diff>